<commit_message>
Bots can go to the player
</commit_message>
<xml_diff>
--- a/Презентация.pptx
+++ b/Презентация.pptx
@@ -347,7 +347,7 @@
           <a:p>
             <a:fld id="{46FE7FA2-437C-4797-917E-FA5D56212DDE}" type="datetimeFigureOut">
               <a:rPr lang="ru-RU" smtClean="0"/>
-              <a:t>07.01.2022</a:t>
+              <a:t>08.01.2022</a:t>
             </a:fld>
             <a:endParaRPr lang="ru-RU"/>
           </a:p>
@@ -681,7 +681,7 @@
           <a:p>
             <a:fld id="{46FE7FA2-437C-4797-917E-FA5D56212DDE}" type="datetimeFigureOut">
               <a:rPr lang="ru-RU" smtClean="0"/>
-              <a:t>07.01.2022</a:t>
+              <a:t>08.01.2022</a:t>
             </a:fld>
             <a:endParaRPr lang="ru-RU"/>
           </a:p>
@@ -959,7 +959,7 @@
           <a:p>
             <a:fld id="{46FE7FA2-437C-4797-917E-FA5D56212DDE}" type="datetimeFigureOut">
               <a:rPr lang="ru-RU" smtClean="0"/>
-              <a:t>07.01.2022</a:t>
+              <a:t>08.01.2022</a:t>
             </a:fld>
             <a:endParaRPr lang="ru-RU"/>
           </a:p>
@@ -1527,7 +1527,7 @@
           <a:p>
             <a:fld id="{46FE7FA2-437C-4797-917E-FA5D56212DDE}" type="datetimeFigureOut">
               <a:rPr lang="ru-RU" smtClean="0"/>
-              <a:t>07.01.2022</a:t>
+              <a:t>08.01.2022</a:t>
             </a:fld>
             <a:endParaRPr lang="ru-RU"/>
           </a:p>
@@ -1805,7 +1805,7 @@
           <a:p>
             <a:fld id="{46FE7FA2-437C-4797-917E-FA5D56212DDE}" type="datetimeFigureOut">
               <a:rPr lang="ru-RU" smtClean="0"/>
-              <a:t>07.01.2022</a:t>
+              <a:t>08.01.2022</a:t>
             </a:fld>
             <a:endParaRPr lang="ru-RU"/>
           </a:p>
@@ -2367,7 +2367,7 @@
           <a:p>
             <a:fld id="{46FE7FA2-437C-4797-917E-FA5D56212DDE}" type="datetimeFigureOut">
               <a:rPr lang="ru-RU" smtClean="0"/>
-              <a:t>07.01.2022</a:t>
+              <a:t>08.01.2022</a:t>
             </a:fld>
             <a:endParaRPr lang="ru-RU"/>
           </a:p>
@@ -2694,7 +2694,7 @@
           <a:p>
             <a:fld id="{46FE7FA2-437C-4797-917E-FA5D56212DDE}" type="datetimeFigureOut">
               <a:rPr lang="ru-RU" smtClean="0"/>
-              <a:t>07.01.2022</a:t>
+              <a:t>08.01.2022</a:t>
             </a:fld>
             <a:endParaRPr lang="ru-RU"/>
           </a:p>
@@ -2871,7 +2871,7 @@
           <a:p>
             <a:fld id="{46FE7FA2-437C-4797-917E-FA5D56212DDE}" type="datetimeFigureOut">
               <a:rPr lang="ru-RU" smtClean="0"/>
-              <a:t>07.01.2022</a:t>
+              <a:t>08.01.2022</a:t>
             </a:fld>
             <a:endParaRPr lang="ru-RU"/>
           </a:p>
@@ -3109,7 +3109,7 @@
           <a:p>
             <a:fld id="{46FE7FA2-437C-4797-917E-FA5D56212DDE}" type="datetimeFigureOut">
               <a:rPr lang="ru-RU" smtClean="0"/>
-              <a:t>07.01.2022</a:t>
+              <a:t>08.01.2022</a:t>
             </a:fld>
             <a:endParaRPr lang="ru-RU"/>
           </a:p>
@@ -3309,7 +3309,7 @@
           <a:p>
             <a:fld id="{46FE7FA2-437C-4797-917E-FA5D56212DDE}" type="datetimeFigureOut">
               <a:rPr lang="ru-RU" smtClean="0"/>
-              <a:t>07.01.2022</a:t>
+              <a:t>08.01.2022</a:t>
             </a:fld>
             <a:endParaRPr lang="ru-RU"/>
           </a:p>
@@ -3585,7 +3585,7 @@
           <a:p>
             <a:fld id="{46FE7FA2-437C-4797-917E-FA5D56212DDE}" type="datetimeFigureOut">
               <a:rPr lang="ru-RU" smtClean="0"/>
-              <a:t>07.01.2022</a:t>
+              <a:t>08.01.2022</a:t>
             </a:fld>
             <a:endParaRPr lang="ru-RU"/>
           </a:p>
@@ -3851,7 +3851,7 @@
           <a:p>
             <a:fld id="{46FE7FA2-437C-4797-917E-FA5D56212DDE}" type="datetimeFigureOut">
               <a:rPr lang="ru-RU" smtClean="0"/>
-              <a:t>07.01.2022</a:t>
+              <a:t>08.01.2022</a:t>
             </a:fld>
             <a:endParaRPr lang="ru-RU"/>
           </a:p>
@@ -4225,7 +4225,7 @@
           <a:p>
             <a:fld id="{46FE7FA2-437C-4797-917E-FA5D56212DDE}" type="datetimeFigureOut">
               <a:rPr lang="ru-RU" smtClean="0"/>
-              <a:t>07.01.2022</a:t>
+              <a:t>08.01.2022</a:t>
             </a:fld>
             <a:endParaRPr lang="ru-RU"/>
           </a:p>
@@ -4373,7 +4373,7 @@
           <a:p>
             <a:fld id="{46FE7FA2-437C-4797-917E-FA5D56212DDE}" type="datetimeFigureOut">
               <a:rPr lang="ru-RU" smtClean="0"/>
-              <a:t>07.01.2022</a:t>
+              <a:t>08.01.2022</a:t>
             </a:fld>
             <a:endParaRPr lang="ru-RU"/>
           </a:p>
@@ -4498,7 +4498,7 @@
           <a:p>
             <a:fld id="{46FE7FA2-437C-4797-917E-FA5D56212DDE}" type="datetimeFigureOut">
               <a:rPr lang="ru-RU" smtClean="0"/>
-              <a:t>07.01.2022</a:t>
+              <a:t>08.01.2022</a:t>
             </a:fld>
             <a:endParaRPr lang="ru-RU"/>
           </a:p>
@@ -4783,7 +4783,7 @@
           <a:p>
             <a:fld id="{46FE7FA2-437C-4797-917E-FA5D56212DDE}" type="datetimeFigureOut">
               <a:rPr lang="ru-RU" smtClean="0"/>
-              <a:t>07.01.2022</a:t>
+              <a:t>08.01.2022</a:t>
             </a:fld>
             <a:endParaRPr lang="ru-RU"/>
           </a:p>
@@ -5107,7 +5107,7 @@
           <a:p>
             <a:fld id="{46FE7FA2-437C-4797-917E-FA5D56212DDE}" type="datetimeFigureOut">
               <a:rPr lang="ru-RU" smtClean="0"/>
-              <a:t>07.01.2022</a:t>
+              <a:t>08.01.2022</a:t>
             </a:fld>
             <a:endParaRPr lang="ru-RU"/>
           </a:p>
@@ -5321,7 +5321,7 @@
           <a:p>
             <a:fld id="{46FE7FA2-437C-4797-917E-FA5D56212DDE}" type="datetimeFigureOut">
               <a:rPr lang="ru-RU" smtClean="0"/>
-              <a:t>07.01.2022</a:t>
+              <a:t>08.01.2022</a:t>
             </a:fld>
             <a:endParaRPr lang="ru-RU"/>
           </a:p>
@@ -6620,14 +6620,14 @@
                 <p:ph idx="1"/>
                 <p:extLst>
                   <p:ext uri="{D42A27DB-BD31-4B8C-83A1-F6EECF244321}">
-                    <p14:modId xmlns:p14="http://schemas.microsoft.com/office/powerpoint/2010/main" val="2565544674"/>
+                    <p14:modId xmlns:p14="http://schemas.microsoft.com/office/powerpoint/2010/main" val="1266595247"/>
                   </p:ext>
                 </p:extLst>
               </p:nvPr>
             </p:nvGraphicFramePr>
             <p:xfrm>
-              <a:off x="5020582" y="1688174"/>
-              <a:ext cx="6299119" cy="3311320"/>
+              <a:off x="5001551" y="1795044"/>
+              <a:ext cx="6337180" cy="3025861"/>
             </p:xfrm>
             <a:graphic>
               <a:graphicData uri="http://schemas.microsoft.com/office/drawing/2017/model3d">
@@ -6635,7 +6635,7 @@
                   <am3d:spPr>
                     <a:xfrm>
                       <a:off x="0" y="0"/>
-                      <a:ext cx="6299119" cy="3311320"/>
+                      <a:ext cx="6337180" cy="3025861"/>
                     </a:xfrm>
                     <a:prstGeom prst="rect">
                       <a:avLst/>
@@ -6655,13 +6655,13 @@
                       <am3d:sy n="1000000" d="1000000"/>
                       <am3d:sz n="1000000" d="1000000"/>
                     </am3d:scale>
-                    <am3d:rot ax="3160429" ay="-2133150" az="-2239604"/>
+                    <am3d:rot ax="2875427" ay="-2298176" az="-2068258"/>
                     <am3d:postTrans dx="0" dy="0" dz="0"/>
                   </am3d:trans>
                   <am3d:raster rName="Office3DRenderer" rVer="16.0.8326">
                     <am3d:blip r:embed="rId3"/>
                   </am3d:raster>
-                  <am3d:objViewport viewportSz="7783504"/>
+                  <am3d:objViewport viewportSz="7783503"/>
                   <am3d:ambientLight>
                     <am3d:clr>
                       <a:scrgbClr r="50000" g="50000" b="50000"/>
@@ -6717,8 +6717,8 @@
             </p:blipFill>
             <p:spPr>
               <a:xfrm>
-                <a:off x="5020582" y="1688174"/>
-                <a:ext cx="6299119" cy="3311320"/>
+                <a:off x="5001551" y="1795044"/>
+                <a:ext cx="6337180" cy="3025861"/>
               </a:xfrm>
               <a:prstGeom prst="rect">
                 <a:avLst/>

</xml_diff>